<commit_message>
Made the modification to the Slide Deck. Added a few slides more.
</commit_message>
<xml_diff>
--- a/Data Science Guided Capstone/slide deck/Slide Deck for the Executive Team.pptx
+++ b/Data Science Guided Capstone/slide deck/Slide Deck for the Executive Team.pptx
@@ -6,10 +6,15 @@
   </p:sldMasterIdLst>
   <p:sldIdLst>
     <p:sldId id="256" r:id="rId2"/>
-    <p:sldId id="257" r:id="rId3"/>
-    <p:sldId id="258" r:id="rId4"/>
-    <p:sldId id="261" r:id="rId5"/>
-    <p:sldId id="259" r:id="rId6"/>
+    <p:sldId id="263" r:id="rId3"/>
+    <p:sldId id="262" r:id="rId4"/>
+    <p:sldId id="264" r:id="rId5"/>
+    <p:sldId id="265" r:id="rId6"/>
+    <p:sldId id="266" r:id="rId7"/>
+    <p:sldId id="257" r:id="rId8"/>
+    <p:sldId id="258" r:id="rId9"/>
+    <p:sldId id="261" r:id="rId10"/>
+    <p:sldId id="259" r:id="rId11"/>
   </p:sldIdLst>
   <p:sldSz cx="12192000" cy="6858000"/>
   <p:notesSz cx="6858000" cy="9144000"/>
@@ -108,6 +113,11 @@
       </a:defRPr>
     </a:lvl9pPr>
   </p:defaultTextStyle>
+  <p:extLst>
+    <p:ext uri="{EFAFB233-063F-42B5-8137-9DF3F51BA10A}">
+      <p15:sldGuideLst xmlns:p15="http://schemas.microsoft.com/office/powerpoint/2012/main"/>
+    </p:ext>
+  </p:extLst>
 </p:presentation>
 </file>
 
@@ -296,7 +306,7 @@
           <a:p>
             <a:fld id="{D2D11F99-02ED-46CF-A925-6FF5B3D61042}" type="datetimeFigureOut">
               <a:rPr lang="en-US" smtClean="0"/>
-              <a:t>6/12/2021</a:t>
+              <a:t>6/17/2021</a:t>
             </a:fld>
             <a:endParaRPr lang="en-US"/>
           </a:p>
@@ -594,7 +604,7 @@
           <a:p>
             <a:fld id="{D2D11F99-02ED-46CF-A925-6FF5B3D61042}" type="datetimeFigureOut">
               <a:rPr lang="en-US" smtClean="0"/>
-              <a:t>6/12/2021</a:t>
+              <a:t>6/17/2021</a:t>
             </a:fld>
             <a:endParaRPr lang="en-US"/>
           </a:p>
@@ -786,7 +796,7 @@
           <a:p>
             <a:fld id="{D2D11F99-02ED-46CF-A925-6FF5B3D61042}" type="datetimeFigureOut">
               <a:rPr lang="en-US" smtClean="0"/>
-              <a:t>6/12/2021</a:t>
+              <a:t>6/17/2021</a:t>
             </a:fld>
             <a:endParaRPr lang="en-US"/>
           </a:p>
@@ -1047,7 +1057,7 @@
           <a:p>
             <a:fld id="{D2D11F99-02ED-46CF-A925-6FF5B3D61042}" type="datetimeFigureOut">
               <a:rPr lang="en-US" smtClean="0"/>
-              <a:t>6/12/2021</a:t>
+              <a:t>6/17/2021</a:t>
             </a:fld>
             <a:endParaRPr lang="en-US"/>
           </a:p>
@@ -1471,7 +1481,7 @@
           <a:p>
             <a:fld id="{D2D11F99-02ED-46CF-A925-6FF5B3D61042}" type="datetimeFigureOut">
               <a:rPr lang="en-US" smtClean="0"/>
-              <a:t>6/12/2021</a:t>
+              <a:t>6/17/2021</a:t>
             </a:fld>
             <a:endParaRPr lang="en-US"/>
           </a:p>
@@ -2008,7 +2018,7 @@
           <a:p>
             <a:fld id="{D2D11F99-02ED-46CF-A925-6FF5B3D61042}" type="datetimeFigureOut">
               <a:rPr lang="en-US" smtClean="0"/>
-              <a:t>6/12/2021</a:t>
+              <a:t>6/17/2021</a:t>
             </a:fld>
             <a:endParaRPr lang="en-US"/>
           </a:p>
@@ -2872,7 +2882,7 @@
           <a:p>
             <a:fld id="{D2D11F99-02ED-46CF-A925-6FF5B3D61042}" type="datetimeFigureOut">
               <a:rPr lang="en-US" smtClean="0"/>
-              <a:t>6/12/2021</a:t>
+              <a:t>6/17/2021</a:t>
             </a:fld>
             <a:endParaRPr lang="en-US"/>
           </a:p>
@@ -3042,7 +3052,7 @@
           <a:p>
             <a:fld id="{D2D11F99-02ED-46CF-A925-6FF5B3D61042}" type="datetimeFigureOut">
               <a:rPr lang="en-US" smtClean="0"/>
-              <a:t>6/12/2021</a:t>
+              <a:t>6/17/2021</a:t>
             </a:fld>
             <a:endParaRPr lang="en-US"/>
           </a:p>
@@ -3226,7 +3236,7 @@
           <a:p>
             <a:fld id="{D2D11F99-02ED-46CF-A925-6FF5B3D61042}" type="datetimeFigureOut">
               <a:rPr lang="en-US" smtClean="0"/>
-              <a:t>6/12/2021</a:t>
+              <a:t>6/17/2021</a:t>
             </a:fld>
             <a:endParaRPr lang="en-US"/>
           </a:p>
@@ -3396,7 +3406,7 @@
           <a:p>
             <a:fld id="{D2D11F99-02ED-46CF-A925-6FF5B3D61042}" type="datetimeFigureOut">
               <a:rPr lang="en-US" smtClean="0"/>
-              <a:t>6/12/2021</a:t>
+              <a:t>6/17/2021</a:t>
             </a:fld>
             <a:endParaRPr lang="en-US"/>
           </a:p>
@@ -3640,7 +3650,7 @@
           <a:p>
             <a:fld id="{D2D11F99-02ED-46CF-A925-6FF5B3D61042}" type="datetimeFigureOut">
               <a:rPr lang="en-US" smtClean="0"/>
-              <a:t>6/12/2021</a:t>
+              <a:t>6/17/2021</a:t>
             </a:fld>
             <a:endParaRPr lang="en-US"/>
           </a:p>
@@ -3876,7 +3886,7 @@
           <a:p>
             <a:fld id="{D2D11F99-02ED-46CF-A925-6FF5B3D61042}" type="datetimeFigureOut">
               <a:rPr lang="en-US" smtClean="0"/>
-              <a:t>6/12/2021</a:t>
+              <a:t>6/17/2021</a:t>
             </a:fld>
             <a:endParaRPr lang="en-US"/>
           </a:p>
@@ -4342,7 +4352,7 @@
           <a:p>
             <a:fld id="{D2D11F99-02ED-46CF-A925-6FF5B3D61042}" type="datetimeFigureOut">
               <a:rPr lang="en-US" smtClean="0"/>
-              <a:t>6/12/2021</a:t>
+              <a:t>6/17/2021</a:t>
             </a:fld>
             <a:endParaRPr lang="en-US"/>
           </a:p>
@@ -4460,7 +4470,7 @@
           <a:p>
             <a:fld id="{D2D11F99-02ED-46CF-A925-6FF5B3D61042}" type="datetimeFigureOut">
               <a:rPr lang="en-US" smtClean="0"/>
-              <a:t>6/12/2021</a:t>
+              <a:t>6/17/2021</a:t>
             </a:fld>
             <a:endParaRPr lang="en-US"/>
           </a:p>
@@ -4555,7 +4565,7 @@
           <a:p>
             <a:fld id="{D2D11F99-02ED-46CF-A925-6FF5B3D61042}" type="datetimeFigureOut">
               <a:rPr lang="en-US" smtClean="0"/>
-              <a:t>6/12/2021</a:t>
+              <a:t>6/17/2021</a:t>
             </a:fld>
             <a:endParaRPr lang="en-US"/>
           </a:p>
@@ -4810,7 +4820,7 @@
           <a:p>
             <a:fld id="{D2D11F99-02ED-46CF-A925-6FF5B3D61042}" type="datetimeFigureOut">
               <a:rPr lang="en-US" smtClean="0"/>
-              <a:t>6/12/2021</a:t>
+              <a:t>6/17/2021</a:t>
             </a:fld>
             <a:endParaRPr lang="en-US"/>
           </a:p>
@@ -5110,7 +5120,7 @@
           <a:p>
             <a:fld id="{D2D11F99-02ED-46CF-A925-6FF5B3D61042}" type="datetimeFigureOut">
               <a:rPr lang="en-US" smtClean="0"/>
-              <a:t>6/12/2021</a:t>
+              <a:t>6/17/2021</a:t>
             </a:fld>
             <a:endParaRPr lang="en-US"/>
           </a:p>
@@ -5344,7 +5354,7 @@
           <a:p>
             <a:fld id="{D2D11F99-02ED-46CF-A925-6FF5B3D61042}" type="datetimeFigureOut">
               <a:rPr lang="en-US" smtClean="0"/>
-              <a:t>6/12/2021</a:t>
+              <a:t>6/17/2021</a:t>
             </a:fld>
             <a:endParaRPr lang="en-US"/>
           </a:p>
@@ -6041,13 +6051,17 @@
           </a:xfrm>
         </p:spPr>
         <p:txBody>
-          <a:bodyPr/>
-          <a:lstStyle/>
-          <a:p>
-            <a:r>
-              <a:rPr lang="en-US" dirty="0"/>
-              <a:t>Problem Identification</a:t>
-            </a:r>
+          <a:bodyPr>
+            <a:normAutofit/>
+          </a:bodyPr>
+          <a:lstStyle/>
+          <a:p>
+            <a:pPr algn="l"/>
+            <a:r>
+              <a:rPr lang="en-US" sz="5400" dirty="0"/>
+              <a:t>Big Mountain Resort COR.</a:t>
+            </a:r>
+            <a:endParaRPr lang="en-US" dirty="0"/>
           </a:p>
         </p:txBody>
       </p:sp>
@@ -6069,29 +6083,23 @@
         </p:nvSpPr>
         <p:spPr>
           <a:xfrm>
-            <a:off x="1375983" y="2807595"/>
-            <a:ext cx="9440034" cy="2884867"/>
+            <a:off x="1375983" y="2607973"/>
+            <a:ext cx="9440034" cy="4095482"/>
           </a:xfrm>
         </p:spPr>
         <p:txBody>
           <a:bodyPr>
-            <a:normAutofit fontScale="92500" lnSpcReduction="10000"/>
+            <a:normAutofit/>
           </a:bodyPr>
           <a:lstStyle/>
-          <a:p>
-            <a:r>
-              <a:rPr lang="en-US" b="1" u="sng" dirty="0"/>
-              <a:t>OBJECTIVES</a:t>
-            </a:r>
-          </a:p>
           <a:p>
             <a:pPr marL="342900" indent="-342900" algn="l">
               <a:buFont typeface="Wingdings" panose="05000000000000000000" pitchFamily="2" charset="2"/>
               <a:buChar char="ü"/>
             </a:pPr>
             <a:r>
-              <a:rPr lang="en-US" dirty="0"/>
-              <a:t>Financial loss of $1,500,000 due to the expense of maintaining the new chair lift</a:t>
+              <a:rPr lang="en-US" sz="2800" dirty="0"/>
+              <a:t>location: northwestern Montana</a:t>
             </a:r>
           </a:p>
           <a:p>
@@ -6100,27 +6108,9 @@
               <a:buChar char="ü"/>
             </a:pPr>
             <a:r>
-              <a:rPr lang="en-US" dirty="0"/>
-              <a:t>Lack of proper operational business model based on existing market situation</a:t>
-            </a:r>
-          </a:p>
-          <a:p>
-            <a:endParaRPr lang="en-US" dirty="0"/>
-          </a:p>
-          <a:p>
-            <a:r>
-              <a:rPr lang="en-US" b="1" u="sng" dirty="0">
-                <a:effectLst>
-                  <a:outerShdw blurRad="38100" dist="38100" dir="2700000" algn="tl">
-                    <a:srgbClr val="000000">
-                      <a:alpha val="43137"/>
-                    </a:srgbClr>
-                  </a:outerShdw>
-                </a:effectLst>
-              </a:rPr>
-              <a:t>POSSIBLE TARGETS</a:t>
-            </a:r>
-            <a:endParaRPr lang="en-US" dirty="0"/>
+              <a:rPr lang="en-US" sz="2800" dirty="0"/>
+              <a:t>Vertical: 2,353 ft (717 m)</a:t>
+            </a:r>
           </a:p>
           <a:p>
             <a:pPr marL="342900" indent="-342900" algn="l">
@@ -6128,8 +6118,8 @@
               <a:buChar char="ü"/>
             </a:pPr>
             <a:r>
-              <a:rPr lang="en-US" dirty="0"/>
-              <a:t>Increase admission ticket cost</a:t>
+              <a:rPr lang="en-US" sz="2800" dirty="0"/>
+              <a:t>Top elevation: 6,817 ft (2,078 m)</a:t>
             </a:r>
           </a:p>
           <a:p>
@@ -6138,12 +6128,36 @@
               <a:buChar char="ü"/>
             </a:pPr>
             <a:r>
-              <a:rPr lang="en-US" dirty="0"/>
-              <a:t>Decrease the operational cost on some trails (runs)</a:t>
-            </a:r>
-          </a:p>
-          <a:p>
-            <a:endParaRPr lang="en-US" dirty="0"/>
+              <a:rPr lang="en-US" sz="2800" dirty="0"/>
+              <a:t>Base elevation: 4,464 ft (1,361 m)</a:t>
+            </a:r>
+          </a:p>
+          <a:p>
+            <a:pPr marL="342900" indent="-342900" algn="l">
+              <a:buFont typeface="Wingdings" panose="05000000000000000000" pitchFamily="2" charset="2"/>
+              <a:buChar char="ü"/>
+            </a:pPr>
+            <a:r>
+              <a:rPr lang="en-US" sz="2800" dirty="0"/>
+              <a:t>Skiable area: 3,020 acres (12.2 km2)</a:t>
+            </a:r>
+          </a:p>
+          <a:p>
+            <a:pPr marL="342900" indent="-342900" algn="l">
+              <a:buFont typeface="Wingdings" panose="05000000000000000000" pitchFamily="2" charset="2"/>
+              <a:buChar char="ü"/>
+            </a:pPr>
+            <a:r>
+              <a:rPr lang="en-US" sz="2800" dirty="0"/>
+              <a:t>Runs: 93</a:t>
+            </a:r>
+          </a:p>
+          <a:p>
+            <a:pPr algn="l"/>
+            <a:r>
+              <a:rPr lang="en-US" sz="2800" dirty="0"/>
+              <a:t>														author: Ruslan S</a:t>
+            </a:r>
           </a:p>
         </p:txBody>
       </p:sp>
@@ -6151,6 +6165,161 @@
     <p:extLst>
       <p:ext uri="{BB962C8B-B14F-4D97-AF65-F5344CB8AC3E}">
         <p14:creationId xmlns:p14="http://schemas.microsoft.com/office/powerpoint/2010/main" val="239087901"/>
+      </p:ext>
+    </p:extLst>
+  </p:cSld>
+  <p:clrMapOvr>
+    <a:masterClrMapping/>
+  </p:clrMapOvr>
+</p:sld>
+</file>
+
+<file path=ppt/slides/slide10.xml><?xml version="1.0" encoding="utf-8"?>
+<p:sld xmlns:a="http://schemas.openxmlformats.org/drawingml/2006/main" xmlns:r="http://schemas.openxmlformats.org/officeDocument/2006/relationships" xmlns:p="http://schemas.openxmlformats.org/presentationml/2006/main">
+  <p:cSld>
+    <p:spTree>
+      <p:nvGrpSpPr>
+        <p:cNvPr id="1" name=""/>
+        <p:cNvGrpSpPr/>
+        <p:nvPr/>
+      </p:nvGrpSpPr>
+      <p:grpSpPr>
+        <a:xfrm>
+          <a:off x="0" y="0"/>
+          <a:ext cx="0" cy="0"/>
+          <a:chOff x="0" y="0"/>
+          <a:chExt cx="0" cy="0"/>
+        </a:xfrm>
+      </p:grpSpPr>
+      <p:sp>
+        <p:nvSpPr>
+          <p:cNvPr id="2" name="Title 1">
+            <a:extLst>
+              <a:ext uri="{FF2B5EF4-FFF2-40B4-BE49-F238E27FC236}">
+                <a16:creationId xmlns:a16="http://schemas.microsoft.com/office/drawing/2014/main" id="{993FE3BF-F38A-42A7-A020-3D84738627C9}"/>
+              </a:ext>
+            </a:extLst>
+          </p:cNvPr>
+          <p:cNvSpPr>
+            <a:spLocks noGrp="1"/>
+          </p:cNvSpPr>
+          <p:nvPr>
+            <p:ph type="ctrTitle"/>
+          </p:nvPr>
+        </p:nvSpPr>
+        <p:spPr>
+          <a:xfrm>
+            <a:off x="1370693" y="287875"/>
+            <a:ext cx="9440034" cy="1450774"/>
+          </a:xfrm>
+        </p:spPr>
+        <p:txBody>
+          <a:bodyPr/>
+          <a:lstStyle/>
+          <a:p>
+            <a:pPr algn="l"/>
+            <a:r>
+              <a:rPr lang="en-US" dirty="0"/>
+              <a:t>Conclusion:</a:t>
+            </a:r>
+          </a:p>
+        </p:txBody>
+      </p:sp>
+      <p:sp>
+        <p:nvSpPr>
+          <p:cNvPr id="3" name="Subtitle 2">
+            <a:extLst>
+              <a:ext uri="{FF2B5EF4-FFF2-40B4-BE49-F238E27FC236}">
+                <a16:creationId xmlns:a16="http://schemas.microsoft.com/office/drawing/2014/main" id="{DDCCDF9F-4F02-4A71-BFA9-D2C006C465AF}"/>
+              </a:ext>
+            </a:extLst>
+          </p:cNvPr>
+          <p:cNvSpPr>
+            <a:spLocks noGrp="1"/>
+          </p:cNvSpPr>
+          <p:nvPr>
+            <p:ph type="subTitle" idx="1"/>
+          </p:nvPr>
+        </p:nvSpPr>
+        <p:spPr>
+          <a:xfrm>
+            <a:off x="1370693" y="2781837"/>
+            <a:ext cx="9440034" cy="3419340"/>
+          </a:xfrm>
+        </p:spPr>
+        <p:txBody>
+          <a:bodyPr/>
+          <a:lstStyle/>
+          <a:p>
+            <a:pPr marL="342900" indent="-342900" algn="l">
+              <a:buFont typeface="Wingdings" panose="05000000000000000000" pitchFamily="2" charset="2"/>
+              <a:buChar char="ü"/>
+            </a:pPr>
+            <a:r>
+              <a:rPr lang="en-US" dirty="0"/>
+              <a:t>Model works based on the idea that most resorts set their prices according to market support.</a:t>
+            </a:r>
+          </a:p>
+          <a:p>
+            <a:pPr marL="342900" indent="-342900" algn="l">
+              <a:buFont typeface="Wingdings" panose="05000000000000000000" pitchFamily="2" charset="2"/>
+              <a:buChar char="ü"/>
+            </a:pPr>
+            <a:r>
+              <a:rPr lang="en-US" dirty="0"/>
+              <a:t>Currently, company undercharging for the admission by $5-$10 (within mean absolute error).</a:t>
+            </a:r>
+          </a:p>
+          <a:p>
+            <a:pPr marL="342900" indent="-342900" algn="l">
+              <a:buFont typeface="Wingdings" panose="05000000000000000000" pitchFamily="2" charset="2"/>
+              <a:buChar char="ü"/>
+            </a:pPr>
+            <a:r>
+              <a:rPr lang="en-US" dirty="0"/>
+              <a:t>Adding new chair lift in the future will not increase the annual revenue (most likely it will decrease it significantly).</a:t>
+            </a:r>
+          </a:p>
+          <a:p>
+            <a:pPr marL="342900" indent="-342900" algn="l">
+              <a:buFont typeface="Wingdings" panose="05000000000000000000" pitchFamily="2" charset="2"/>
+              <a:buChar char="ü"/>
+            </a:pPr>
+            <a:r>
+              <a:rPr lang="en-US" dirty="0"/>
+              <a:t>Investing in vertical drop will bring increase by $2 on average.</a:t>
+            </a:r>
+          </a:p>
+          <a:p>
+            <a:pPr marL="342900" indent="-342900" algn="l">
+              <a:buFont typeface="Wingdings" panose="05000000000000000000" pitchFamily="2" charset="2"/>
+              <a:buChar char="ü"/>
+            </a:pPr>
+            <a:r>
+              <a:rPr lang="en-US" dirty="0"/>
+              <a:t>Dropping operational cost on a few runs (3 of them) will save some money.</a:t>
+            </a:r>
+          </a:p>
+          <a:p>
+            <a:pPr marL="342900" indent="-342900" algn="l">
+              <a:buFont typeface="Wingdings" panose="05000000000000000000" pitchFamily="2" charset="2"/>
+              <a:buChar char="ü"/>
+            </a:pPr>
+            <a:endParaRPr lang="en-US" dirty="0"/>
+          </a:p>
+          <a:p>
+            <a:pPr marL="342900" indent="-342900" algn="l">
+              <a:buFont typeface="Wingdings" panose="05000000000000000000" pitchFamily="2" charset="2"/>
+              <a:buChar char="ü"/>
+            </a:pPr>
+            <a:endParaRPr lang="en-US" dirty="0"/>
+          </a:p>
+        </p:txBody>
+      </p:sp>
+    </p:spTree>
+    <p:extLst>
+      <p:ext uri="{BB962C8B-B14F-4D97-AF65-F5344CB8AC3E}">
+        <p14:creationId xmlns:p14="http://schemas.microsoft.com/office/powerpoint/2010/main" val="713166741"/>
       </p:ext>
     </p:extLst>
   </p:cSld>
@@ -6195,24 +6364,1091 @@
         </p:nvSpPr>
         <p:spPr>
           <a:xfrm>
-            <a:off x="1375983" y="44999"/>
-            <a:ext cx="9440034" cy="1828801"/>
+            <a:off x="1370693" y="410819"/>
+            <a:ext cx="9440034" cy="1295632"/>
           </a:xfrm>
         </p:spPr>
         <p:txBody>
           <a:bodyPr/>
           <a:lstStyle/>
           <a:p>
+            <a:pPr algn="l"/>
             <a:r>
               <a:rPr lang="en-US" dirty="0"/>
-              <a:t>Recommendation </a:t>
-            </a:r>
-            <a:br>
+              <a:t>Objectives:</a:t>
+            </a:r>
+          </a:p>
+        </p:txBody>
+      </p:sp>
+      <p:sp>
+        <p:nvSpPr>
+          <p:cNvPr id="3" name="Subtitle 2">
+            <a:extLst>
+              <a:ext uri="{FF2B5EF4-FFF2-40B4-BE49-F238E27FC236}">
+                <a16:creationId xmlns:a16="http://schemas.microsoft.com/office/drawing/2014/main" id="{DDCCDF9F-4F02-4A71-BFA9-D2C006C465AF}"/>
+              </a:ext>
+            </a:extLst>
+          </p:cNvPr>
+          <p:cNvSpPr>
+            <a:spLocks noGrp="1"/>
+          </p:cNvSpPr>
+          <p:nvPr>
+            <p:ph type="subTitle" idx="1"/>
+          </p:nvPr>
+        </p:nvSpPr>
+        <p:spPr>
+          <a:xfrm>
+            <a:off x="1375983" y="2807595"/>
+            <a:ext cx="9440034" cy="2884867"/>
+          </a:xfrm>
+        </p:spPr>
+        <p:txBody>
+          <a:bodyPr>
+            <a:normAutofit/>
+          </a:bodyPr>
+          <a:lstStyle/>
+          <a:p>
+            <a:pPr marL="342900" indent="-342900" algn="l">
+              <a:buFont typeface="Wingdings" panose="05000000000000000000" pitchFamily="2" charset="2"/>
+              <a:buChar char="ü"/>
+            </a:pPr>
+            <a:r>
+              <a:rPr lang="en-US" sz="2800" dirty="0"/>
+              <a:t>Recover from the financial loss of $1,500,000 due to the expense of maintaining the new chair lift.</a:t>
+            </a:r>
+          </a:p>
+          <a:p>
+            <a:pPr marL="342900" indent="-342900" algn="l">
+              <a:buFont typeface="Wingdings" panose="05000000000000000000" pitchFamily="2" charset="2"/>
+              <a:buChar char="ü"/>
+            </a:pPr>
+            <a:r>
+              <a:rPr lang="en-US" sz="2800" dirty="0"/>
+              <a:t>Gain the knowledge of operational business models based on the existing market situation.</a:t>
+            </a:r>
+          </a:p>
+          <a:p>
+            <a:pPr marL="342900" indent="-342900" algn="l">
+              <a:buFont typeface="Wingdings" panose="05000000000000000000" pitchFamily="2" charset="2"/>
+              <a:buChar char="ü"/>
+            </a:pPr>
+            <a:r>
+              <a:rPr lang="en-US" sz="2800" dirty="0"/>
+              <a:t>Optimize the cost of some services on particular objects.</a:t>
+            </a:r>
+          </a:p>
+        </p:txBody>
+      </p:sp>
+    </p:spTree>
+    <p:extLst>
+      <p:ext uri="{BB962C8B-B14F-4D97-AF65-F5344CB8AC3E}">
+        <p14:creationId xmlns:p14="http://schemas.microsoft.com/office/powerpoint/2010/main" val="2208894388"/>
+      </p:ext>
+    </p:extLst>
+  </p:cSld>
+  <p:clrMapOvr>
+    <a:masterClrMapping/>
+  </p:clrMapOvr>
+</p:sld>
+</file>
+
+<file path=ppt/slides/slide3.xml><?xml version="1.0" encoding="utf-8"?>
+<p:sld xmlns:a="http://schemas.openxmlformats.org/drawingml/2006/main" xmlns:r="http://schemas.openxmlformats.org/officeDocument/2006/relationships" xmlns:p="http://schemas.openxmlformats.org/presentationml/2006/main">
+  <p:cSld>
+    <p:spTree>
+      <p:nvGrpSpPr>
+        <p:cNvPr id="1" name=""/>
+        <p:cNvGrpSpPr/>
+        <p:nvPr/>
+      </p:nvGrpSpPr>
+      <p:grpSpPr>
+        <a:xfrm>
+          <a:off x="0" y="0"/>
+          <a:ext cx="0" cy="0"/>
+          <a:chOff x="0" y="0"/>
+          <a:chExt cx="0" cy="0"/>
+        </a:xfrm>
+      </p:grpSpPr>
+      <p:sp>
+        <p:nvSpPr>
+          <p:cNvPr id="2" name="Title 1">
+            <a:extLst>
+              <a:ext uri="{FF2B5EF4-FFF2-40B4-BE49-F238E27FC236}">
+                <a16:creationId xmlns:a16="http://schemas.microsoft.com/office/drawing/2014/main" id="{993FE3BF-F38A-42A7-A020-3D84738627C9}"/>
+              </a:ext>
+            </a:extLst>
+          </p:cNvPr>
+          <p:cNvSpPr>
+            <a:spLocks noGrp="1"/>
+          </p:cNvSpPr>
+          <p:nvPr>
+            <p:ph type="ctrTitle"/>
+          </p:nvPr>
+        </p:nvSpPr>
+        <p:spPr>
+          <a:xfrm>
+            <a:off x="1370693" y="410819"/>
+            <a:ext cx="9440034" cy="1295632"/>
+          </a:xfrm>
+        </p:spPr>
+        <p:txBody>
+          <a:bodyPr/>
+          <a:lstStyle/>
+          <a:p>
+            <a:pPr algn="l"/>
+            <a:r>
               <a:rPr lang="en-US" dirty="0"/>
-            </a:br>
+              <a:t>Possible Targets:</a:t>
+            </a:r>
+          </a:p>
+        </p:txBody>
+      </p:sp>
+      <p:sp>
+        <p:nvSpPr>
+          <p:cNvPr id="3" name="Subtitle 2">
+            <a:extLst>
+              <a:ext uri="{FF2B5EF4-FFF2-40B4-BE49-F238E27FC236}">
+                <a16:creationId xmlns:a16="http://schemas.microsoft.com/office/drawing/2014/main" id="{DDCCDF9F-4F02-4A71-BFA9-D2C006C465AF}"/>
+              </a:ext>
+            </a:extLst>
+          </p:cNvPr>
+          <p:cNvSpPr>
+            <a:spLocks noGrp="1"/>
+          </p:cNvSpPr>
+          <p:nvPr>
+            <p:ph type="subTitle" idx="1"/>
+          </p:nvPr>
+        </p:nvSpPr>
+        <p:spPr>
+          <a:xfrm>
+            <a:off x="1375983" y="2807595"/>
+            <a:ext cx="9719166" cy="3148884"/>
+          </a:xfrm>
+        </p:spPr>
+        <p:txBody>
+          <a:bodyPr>
+            <a:normAutofit/>
+          </a:bodyPr>
+          <a:lstStyle/>
+          <a:p>
+            <a:pPr marL="457200" indent="-457200" algn="l">
+              <a:buFont typeface="Wingdings" panose="05000000000000000000" pitchFamily="2" charset="2"/>
+              <a:buChar char="ü"/>
+            </a:pPr>
+            <a:r>
+              <a:rPr lang="en-US" sz="2800" dirty="0"/>
+              <a:t>The value of admission during business days and weekends.</a:t>
+            </a:r>
+          </a:p>
+          <a:p>
+            <a:pPr marL="457200" indent="-457200" algn="l">
+              <a:buFont typeface="Wingdings" panose="05000000000000000000" pitchFamily="2" charset="2"/>
+              <a:buChar char="ü"/>
+            </a:pPr>
+            <a:r>
+              <a:rPr lang="en-US" sz="2800" dirty="0"/>
+              <a:t>The operational cost of some services.</a:t>
+            </a:r>
+          </a:p>
+          <a:p>
+            <a:pPr marL="457200" indent="-457200" algn="l">
+              <a:buFont typeface="Wingdings" panose="05000000000000000000" pitchFamily="2" charset="2"/>
+              <a:buChar char="ü"/>
+            </a:pPr>
+            <a:r>
+              <a:rPr lang="en-US" sz="2800" dirty="0"/>
+              <a:t>Business model.</a:t>
+            </a:r>
+          </a:p>
+          <a:p>
+            <a:pPr marL="457200" indent="-457200" algn="l">
+              <a:buFont typeface="Wingdings" panose="05000000000000000000" pitchFamily="2" charset="2"/>
+              <a:buChar char="ü"/>
+            </a:pPr>
+            <a:r>
+              <a:rPr lang="en-US" sz="2800" dirty="0"/>
+              <a:t>Promotions.</a:t>
+            </a:r>
+          </a:p>
+        </p:txBody>
+      </p:sp>
+    </p:spTree>
+    <p:extLst>
+      <p:ext uri="{BB962C8B-B14F-4D97-AF65-F5344CB8AC3E}">
+        <p14:creationId xmlns:p14="http://schemas.microsoft.com/office/powerpoint/2010/main" val="282303459"/>
+      </p:ext>
+    </p:extLst>
+  </p:cSld>
+  <p:clrMapOvr>
+    <a:masterClrMapping/>
+  </p:clrMapOvr>
+</p:sld>
+</file>
+
+<file path=ppt/slides/slide4.xml><?xml version="1.0" encoding="utf-8"?>
+<p:sld xmlns:a="http://schemas.openxmlformats.org/drawingml/2006/main" xmlns:r="http://schemas.openxmlformats.org/officeDocument/2006/relationships" xmlns:p="http://schemas.openxmlformats.org/presentationml/2006/main">
+  <p:cSld>
+    <p:spTree>
+      <p:nvGrpSpPr>
+        <p:cNvPr id="1" name=""/>
+        <p:cNvGrpSpPr/>
+        <p:nvPr/>
+      </p:nvGrpSpPr>
+      <p:grpSpPr>
+        <a:xfrm>
+          <a:off x="0" y="0"/>
+          <a:ext cx="0" cy="0"/>
+          <a:chOff x="0" y="0"/>
+          <a:chExt cx="0" cy="0"/>
+        </a:xfrm>
+      </p:grpSpPr>
+      <p:sp>
+        <p:nvSpPr>
+          <p:cNvPr id="2" name="Title 1">
+            <a:extLst>
+              <a:ext uri="{FF2B5EF4-FFF2-40B4-BE49-F238E27FC236}">
+                <a16:creationId xmlns:a16="http://schemas.microsoft.com/office/drawing/2014/main" id="{993FE3BF-F38A-42A7-A020-3D84738627C9}"/>
+              </a:ext>
+            </a:extLst>
+          </p:cNvPr>
+          <p:cNvSpPr>
+            <a:spLocks noGrp="1"/>
+          </p:cNvSpPr>
+          <p:nvPr>
+            <p:ph type="ctrTitle"/>
+          </p:nvPr>
+        </p:nvSpPr>
+        <p:spPr>
+          <a:xfrm>
+            <a:off x="650384" y="410819"/>
+            <a:ext cx="10160343" cy="1089570"/>
+          </a:xfrm>
+        </p:spPr>
+        <p:txBody>
+          <a:bodyPr/>
+          <a:lstStyle/>
+          <a:p>
+            <a:pPr algn="l"/>
             <a:r>
               <a:rPr lang="en-US" dirty="0"/>
-              <a:t>and key findings</a:t>
+              <a:t>Munging issues:</a:t>
+            </a:r>
+          </a:p>
+        </p:txBody>
+      </p:sp>
+      <p:sp>
+        <p:nvSpPr>
+          <p:cNvPr id="3" name="Subtitle 2">
+            <a:extLst>
+              <a:ext uri="{FF2B5EF4-FFF2-40B4-BE49-F238E27FC236}">
+                <a16:creationId xmlns:a16="http://schemas.microsoft.com/office/drawing/2014/main" id="{DDCCDF9F-4F02-4A71-BFA9-D2C006C465AF}"/>
+              </a:ext>
+            </a:extLst>
+          </p:cNvPr>
+          <p:cNvSpPr>
+            <a:spLocks noGrp="1"/>
+          </p:cNvSpPr>
+          <p:nvPr>
+            <p:ph type="subTitle" idx="1"/>
+          </p:nvPr>
+        </p:nvSpPr>
+        <p:spPr>
+          <a:xfrm>
+            <a:off x="650383" y="1868534"/>
+            <a:ext cx="4958365" cy="4281128"/>
+          </a:xfrm>
+        </p:spPr>
+        <p:txBody>
+          <a:bodyPr>
+            <a:normAutofit/>
+          </a:bodyPr>
+          <a:lstStyle/>
+          <a:p>
+            <a:pPr algn="l"/>
+            <a:r>
+              <a:rPr lang="en-US" sz="2800" dirty="0"/>
+              <a:t>Missing features (variables) that will affect the performance of the model:</a:t>
+            </a:r>
+          </a:p>
+          <a:p>
+            <a:pPr marL="914400" lvl="1" indent="-457200" algn="l">
+              <a:buFont typeface="Wingdings" panose="05000000000000000000" pitchFamily="2" charset="2"/>
+              <a:buChar char="ü"/>
+            </a:pPr>
+            <a:r>
+              <a:rPr lang="en-US" sz="2600" dirty="0"/>
+              <a:t>Snow </a:t>
+            </a:r>
+            <a:r>
+              <a:rPr lang="en-US" sz="2600" dirty="0" err="1"/>
+              <a:t>Making_ac</a:t>
+            </a:r>
+            <a:endParaRPr lang="en-US" sz="2600" dirty="0"/>
+          </a:p>
+          <a:p>
+            <a:pPr marL="914400" lvl="1" indent="-457200" algn="l">
+              <a:buFont typeface="Wingdings" panose="05000000000000000000" pitchFamily="2" charset="2"/>
+              <a:buChar char="ü"/>
+            </a:pPr>
+            <a:r>
+              <a:rPr lang="en-US" sz="2600" dirty="0"/>
+              <a:t>Runs</a:t>
+            </a:r>
+          </a:p>
+          <a:p>
+            <a:pPr marL="914400" lvl="1" indent="-457200" algn="l">
+              <a:buFont typeface="Wingdings" panose="05000000000000000000" pitchFamily="2" charset="2"/>
+              <a:buChar char="ü"/>
+            </a:pPr>
+            <a:r>
+              <a:rPr lang="en-US" sz="2600" dirty="0" err="1"/>
+              <a:t>AdultWeekday</a:t>
+            </a:r>
+            <a:endParaRPr lang="en-US" sz="2600" dirty="0"/>
+          </a:p>
+          <a:p>
+            <a:pPr marL="914400" lvl="1" indent="-457200" algn="l">
+              <a:buFont typeface="Wingdings" panose="05000000000000000000" pitchFamily="2" charset="2"/>
+              <a:buChar char="ü"/>
+            </a:pPr>
+            <a:r>
+              <a:rPr lang="en-US" sz="2600" dirty="0" err="1"/>
+              <a:t>AdultWeekend</a:t>
+            </a:r>
+            <a:endParaRPr lang="en-US" sz="2600" dirty="0"/>
+          </a:p>
+          <a:p>
+            <a:pPr marL="914400" lvl="1" indent="-457200" algn="l">
+              <a:buFont typeface="Wingdings" panose="05000000000000000000" pitchFamily="2" charset="2"/>
+              <a:buChar char="ü"/>
+            </a:pPr>
+            <a:r>
+              <a:rPr lang="en-US" sz="2600" dirty="0" err="1"/>
+              <a:t>NightSkiitn_ac</a:t>
+            </a:r>
+            <a:endParaRPr lang="en-US" sz="2600" dirty="0"/>
+          </a:p>
+        </p:txBody>
+      </p:sp>
+      <p:pic>
+        <p:nvPicPr>
+          <p:cNvPr id="5" name="Picture 4" descr="Table&#10;&#10;Description automatically generated">
+            <a:extLst>
+              <a:ext uri="{FF2B5EF4-FFF2-40B4-BE49-F238E27FC236}">
+                <a16:creationId xmlns:a16="http://schemas.microsoft.com/office/drawing/2014/main" id="{C1DC68A5-2C75-4F1F-BD5C-5F9C227D7A76}"/>
+              </a:ext>
+            </a:extLst>
+          </p:cNvPr>
+          <p:cNvPicPr>
+            <a:picLocks noChangeAspect="1"/>
+          </p:cNvPicPr>
+          <p:nvPr/>
+        </p:nvPicPr>
+        <p:blipFill>
+          <a:blip r:embed="rId2">
+            <a:extLst>
+              <a:ext uri="{28A0092B-C50C-407E-A947-70E740481C1C}">
+                <a14:useLocalDpi xmlns:a14="http://schemas.microsoft.com/office/drawing/2010/main" val="0"/>
+              </a:ext>
+            </a:extLst>
+          </a:blip>
+          <a:stretch>
+            <a:fillRect/>
+          </a:stretch>
+        </p:blipFill>
+        <p:spPr>
+          <a:xfrm>
+            <a:off x="5794227" y="1868534"/>
+            <a:ext cx="5975426" cy="4281128"/>
+          </a:xfrm>
+          <a:prstGeom prst="roundRect">
+            <a:avLst>
+              <a:gd name="adj" fmla="val 8594"/>
+            </a:avLst>
+          </a:prstGeom>
+          <a:solidFill>
+            <a:srgbClr val="FFFFFF">
+              <a:shade val="85000"/>
+            </a:srgbClr>
+          </a:solidFill>
+          <a:ln>
+            <a:noFill/>
+          </a:ln>
+          <a:effectLst>
+            <a:reflection blurRad="12700" stA="38000" endPos="28000" dist="5000" dir="5400000" sy="-100000" algn="bl" rotWithShape="0"/>
+          </a:effectLst>
+        </p:spPr>
+      </p:pic>
+    </p:spTree>
+    <p:extLst>
+      <p:ext uri="{BB962C8B-B14F-4D97-AF65-F5344CB8AC3E}">
+        <p14:creationId xmlns:p14="http://schemas.microsoft.com/office/powerpoint/2010/main" val="1674020149"/>
+      </p:ext>
+    </p:extLst>
+  </p:cSld>
+  <p:clrMapOvr>
+    <a:masterClrMapping/>
+  </p:clrMapOvr>
+</p:sld>
+</file>
+
+<file path=ppt/slides/slide5.xml><?xml version="1.0" encoding="utf-8"?>
+<p:sld xmlns:a="http://schemas.openxmlformats.org/drawingml/2006/main" xmlns:r="http://schemas.openxmlformats.org/officeDocument/2006/relationships" xmlns:p="http://schemas.openxmlformats.org/presentationml/2006/main">
+  <p:cSld>
+    <p:spTree>
+      <p:nvGrpSpPr>
+        <p:cNvPr id="1" name=""/>
+        <p:cNvGrpSpPr/>
+        <p:nvPr/>
+      </p:nvGrpSpPr>
+      <p:grpSpPr>
+        <a:xfrm>
+          <a:off x="0" y="0"/>
+          <a:ext cx="0" cy="0"/>
+          <a:chOff x="0" y="0"/>
+          <a:chExt cx="0" cy="0"/>
+        </a:xfrm>
+      </p:grpSpPr>
+      <p:sp>
+        <p:nvSpPr>
+          <p:cNvPr id="2" name="Title 1">
+            <a:extLst>
+              <a:ext uri="{FF2B5EF4-FFF2-40B4-BE49-F238E27FC236}">
+                <a16:creationId xmlns:a16="http://schemas.microsoft.com/office/drawing/2014/main" id="{993FE3BF-F38A-42A7-A020-3D84738627C9}"/>
+              </a:ext>
+            </a:extLst>
+          </p:cNvPr>
+          <p:cNvSpPr>
+            <a:spLocks noGrp="1"/>
+          </p:cNvSpPr>
+          <p:nvPr>
+            <p:ph type="ctrTitle"/>
+          </p:nvPr>
+        </p:nvSpPr>
+        <p:spPr>
+          <a:xfrm>
+            <a:off x="321972" y="618185"/>
+            <a:ext cx="5853449" cy="1056069"/>
+          </a:xfrm>
+        </p:spPr>
+        <p:txBody>
+          <a:bodyPr>
+            <a:normAutofit fontScale="90000"/>
+          </a:bodyPr>
+          <a:lstStyle/>
+          <a:p>
+            <a:pPr algn="l"/>
+            <a:r>
+              <a:rPr lang="en-US" dirty="0"/>
+              <a:t>Average ticket price by State:</a:t>
+            </a:r>
+          </a:p>
+        </p:txBody>
+      </p:sp>
+      <p:sp>
+        <p:nvSpPr>
+          <p:cNvPr id="3" name="Subtitle 2">
+            <a:extLst>
+              <a:ext uri="{FF2B5EF4-FFF2-40B4-BE49-F238E27FC236}">
+                <a16:creationId xmlns:a16="http://schemas.microsoft.com/office/drawing/2014/main" id="{DDCCDF9F-4F02-4A71-BFA9-D2C006C465AF}"/>
+              </a:ext>
+            </a:extLst>
+          </p:cNvPr>
+          <p:cNvSpPr>
+            <a:spLocks noGrp="1"/>
+          </p:cNvSpPr>
+          <p:nvPr>
+            <p:ph type="subTitle" idx="1"/>
+          </p:nvPr>
+        </p:nvSpPr>
+        <p:spPr>
+          <a:xfrm>
+            <a:off x="650383" y="1868534"/>
+            <a:ext cx="4958365" cy="4281128"/>
+          </a:xfrm>
+        </p:spPr>
+        <p:txBody>
+          <a:bodyPr>
+            <a:normAutofit/>
+          </a:bodyPr>
+          <a:lstStyle/>
+          <a:p>
+            <a:pPr algn="l"/>
+            <a:r>
+              <a:rPr lang="en-US" sz="2800" dirty="0"/>
+              <a:t>Key points to take away:</a:t>
+            </a:r>
+          </a:p>
+          <a:p>
+            <a:pPr marL="457200" indent="-457200" algn="l">
+              <a:buFont typeface="Wingdings" panose="05000000000000000000" pitchFamily="2" charset="2"/>
+              <a:buChar char="ü"/>
+            </a:pPr>
+            <a:r>
+              <a:rPr lang="en-US" sz="2800" dirty="0"/>
+              <a:t>Most prices are in California, Colorado, and Utah.</a:t>
+            </a:r>
+          </a:p>
+          <a:p>
+            <a:pPr marL="457200" indent="-457200" algn="l">
+              <a:buFont typeface="Wingdings" panose="05000000000000000000" pitchFamily="2" charset="2"/>
+              <a:buChar char="ü"/>
+            </a:pPr>
+            <a:r>
+              <a:rPr lang="en-US" sz="2800" dirty="0"/>
+              <a:t>Some states show more variability than others between weekdays and weekends.</a:t>
+            </a:r>
+            <a:endParaRPr lang="en-US" sz="2600" dirty="0"/>
+          </a:p>
+        </p:txBody>
+      </p:sp>
+      <p:grpSp>
+        <p:nvGrpSpPr>
+          <p:cNvPr id="9" name="Group 8">
+            <a:extLst>
+              <a:ext uri="{FF2B5EF4-FFF2-40B4-BE49-F238E27FC236}">
+                <a16:creationId xmlns:a16="http://schemas.microsoft.com/office/drawing/2014/main" id="{64119915-6FFB-49B3-AC7B-B2C8413CD6BB}"/>
+              </a:ext>
+            </a:extLst>
+          </p:cNvPr>
+          <p:cNvGrpSpPr/>
+          <p:nvPr/>
+        </p:nvGrpSpPr>
+        <p:grpSpPr>
+          <a:xfrm>
+            <a:off x="5737539" y="151052"/>
+            <a:ext cx="6335428" cy="6555895"/>
+            <a:chOff x="5737539" y="151052"/>
+            <a:chExt cx="6335428" cy="6555895"/>
+          </a:xfrm>
+        </p:grpSpPr>
+        <p:pic>
+          <p:nvPicPr>
+            <p:cNvPr id="6" name="Picture 5" descr="Chart, bar chart&#10;&#10;Description automatically generated">
+              <a:extLst>
+                <a:ext uri="{FF2B5EF4-FFF2-40B4-BE49-F238E27FC236}">
+                  <a16:creationId xmlns:a16="http://schemas.microsoft.com/office/drawing/2014/main" id="{4B4456E3-F7AF-4ADC-9B38-BB6DD04CF4CD}"/>
+                </a:ext>
+              </a:extLst>
+            </p:cNvPr>
+            <p:cNvPicPr>
+              <a:picLocks noChangeAspect="1"/>
+            </p:cNvPicPr>
+            <p:nvPr/>
+          </p:nvPicPr>
+          <p:blipFill>
+            <a:blip r:embed="rId2">
+              <a:extLst>
+                <a:ext uri="{28A0092B-C50C-407E-A947-70E740481C1C}">
+                  <a14:useLocalDpi xmlns:a14="http://schemas.microsoft.com/office/drawing/2010/main" val="0"/>
+                </a:ext>
+              </a:extLst>
+            </a:blip>
+            <a:stretch>
+              <a:fillRect/>
+            </a:stretch>
+          </p:blipFill>
+          <p:spPr>
+            <a:xfrm>
+              <a:off x="5737539" y="151052"/>
+              <a:ext cx="6335428" cy="6555895"/>
+            </a:xfrm>
+            <a:prstGeom prst="roundRect">
+              <a:avLst>
+                <a:gd name="adj" fmla="val 8594"/>
+              </a:avLst>
+            </a:prstGeom>
+            <a:solidFill>
+              <a:srgbClr val="FFFFFF">
+                <a:shade val="85000"/>
+              </a:srgbClr>
+            </a:solidFill>
+            <a:ln>
+              <a:noFill/>
+            </a:ln>
+            <a:effectLst>
+              <a:reflection blurRad="12700" stA="38000" endPos="28000" dist="5000" dir="5400000" sy="-100000" algn="bl" rotWithShape="0"/>
+            </a:effectLst>
+          </p:spPr>
+        </p:pic>
+        <p:sp>
+          <p:nvSpPr>
+            <p:cNvPr id="8" name="Arrow: Left 7">
+              <a:extLst>
+                <a:ext uri="{FF2B5EF4-FFF2-40B4-BE49-F238E27FC236}">
+                  <a16:creationId xmlns:a16="http://schemas.microsoft.com/office/drawing/2014/main" id="{3F239D66-31EF-4B8F-91F6-15F9B76F29E0}"/>
+                </a:ext>
+              </a:extLst>
+            </p:cNvPr>
+            <p:cNvSpPr/>
+            <p:nvPr/>
+          </p:nvSpPr>
+          <p:spPr>
+            <a:xfrm>
+              <a:off x="9697792" y="2425819"/>
+              <a:ext cx="1783723" cy="169274"/>
+            </a:xfrm>
+            <a:prstGeom prst="leftArrow">
+              <a:avLst/>
+            </a:prstGeom>
+          </p:spPr>
+          <p:style>
+            <a:lnRef idx="2">
+              <a:schemeClr val="accent1">
+                <a:shade val="50000"/>
+              </a:schemeClr>
+            </a:lnRef>
+            <a:fillRef idx="1">
+              <a:schemeClr val="accent1"/>
+            </a:fillRef>
+            <a:effectRef idx="0">
+              <a:schemeClr val="accent1"/>
+            </a:effectRef>
+            <a:fontRef idx="minor">
+              <a:schemeClr val="lt1"/>
+            </a:fontRef>
+          </p:style>
+          <p:txBody>
+            <a:bodyPr rtlCol="0" anchor="ctr"/>
+            <a:lstStyle/>
+            <a:p>
+              <a:pPr algn="ctr"/>
+              <a:endParaRPr lang="en-US"/>
+            </a:p>
+          </p:txBody>
+        </p:sp>
+      </p:grpSp>
+    </p:spTree>
+    <p:extLst>
+      <p:ext uri="{BB962C8B-B14F-4D97-AF65-F5344CB8AC3E}">
+        <p14:creationId xmlns:p14="http://schemas.microsoft.com/office/powerpoint/2010/main" val="1435180291"/>
+      </p:ext>
+    </p:extLst>
+  </p:cSld>
+  <p:clrMapOvr>
+    <a:masterClrMapping/>
+  </p:clrMapOvr>
+</p:sld>
+</file>
+
+<file path=ppt/slides/slide6.xml><?xml version="1.0" encoding="utf-8"?>
+<p:sld xmlns:a="http://schemas.openxmlformats.org/drawingml/2006/main" xmlns:r="http://schemas.openxmlformats.org/officeDocument/2006/relationships" xmlns:p="http://schemas.openxmlformats.org/presentationml/2006/main">
+  <p:cSld>
+    <p:spTree>
+      <p:nvGrpSpPr>
+        <p:cNvPr id="1" name=""/>
+        <p:cNvGrpSpPr/>
+        <p:nvPr/>
+      </p:nvGrpSpPr>
+      <p:grpSpPr>
+        <a:xfrm>
+          <a:off x="0" y="0"/>
+          <a:ext cx="0" cy="0"/>
+          <a:chOff x="0" y="0"/>
+          <a:chExt cx="0" cy="0"/>
+        </a:xfrm>
+      </p:grpSpPr>
+      <p:sp>
+        <p:nvSpPr>
+          <p:cNvPr id="2" name="Title 1">
+            <a:extLst>
+              <a:ext uri="{FF2B5EF4-FFF2-40B4-BE49-F238E27FC236}">
+                <a16:creationId xmlns:a16="http://schemas.microsoft.com/office/drawing/2014/main" id="{993FE3BF-F38A-42A7-A020-3D84738627C9}"/>
+              </a:ext>
+            </a:extLst>
+          </p:cNvPr>
+          <p:cNvSpPr>
+            <a:spLocks noGrp="1"/>
+          </p:cNvSpPr>
+          <p:nvPr>
+            <p:ph type="ctrTitle"/>
+          </p:nvPr>
+        </p:nvSpPr>
+        <p:spPr>
+          <a:xfrm>
+            <a:off x="321972" y="135229"/>
+            <a:ext cx="5853449" cy="1539026"/>
+          </a:xfrm>
+        </p:spPr>
+        <p:txBody>
+          <a:bodyPr>
+            <a:normAutofit/>
+          </a:bodyPr>
+          <a:lstStyle/>
+          <a:p>
+            <a:pPr algn="l"/>
+            <a:r>
+              <a:rPr lang="en-US" dirty="0"/>
+              <a:t>Correlations:</a:t>
+            </a:r>
+          </a:p>
+        </p:txBody>
+      </p:sp>
+      <p:sp>
+        <p:nvSpPr>
+          <p:cNvPr id="3" name="Subtitle 2">
+            <a:extLst>
+              <a:ext uri="{FF2B5EF4-FFF2-40B4-BE49-F238E27FC236}">
+                <a16:creationId xmlns:a16="http://schemas.microsoft.com/office/drawing/2014/main" id="{DDCCDF9F-4F02-4A71-BFA9-D2C006C465AF}"/>
+              </a:ext>
+            </a:extLst>
+          </p:cNvPr>
+          <p:cNvSpPr>
+            <a:spLocks noGrp="1"/>
+          </p:cNvSpPr>
+          <p:nvPr>
+            <p:ph type="subTitle" idx="1"/>
+          </p:nvPr>
+        </p:nvSpPr>
+        <p:spPr>
+          <a:xfrm>
+            <a:off x="321973" y="3429000"/>
+            <a:ext cx="4597758" cy="3100589"/>
+          </a:xfrm>
+        </p:spPr>
+        <p:txBody>
+          <a:bodyPr>
+            <a:normAutofit/>
+          </a:bodyPr>
+          <a:lstStyle/>
+          <a:p>
+            <a:pPr marL="457200" indent="-457200" algn="l">
+              <a:buFont typeface="Wingdings" panose="05000000000000000000" pitchFamily="2" charset="2"/>
+              <a:buChar char="ü"/>
+            </a:pPr>
+            <a:r>
+              <a:rPr lang="en-US" sz="2800" dirty="0" err="1"/>
+              <a:t>Vertical_drop</a:t>
+            </a:r>
+            <a:endParaRPr lang="en-US" sz="2800" dirty="0"/>
+          </a:p>
+          <a:p>
+            <a:pPr marL="457200" indent="-457200" algn="l">
+              <a:buFont typeface="Wingdings" panose="05000000000000000000" pitchFamily="2" charset="2"/>
+              <a:buChar char="ü"/>
+            </a:pPr>
+            <a:r>
+              <a:rPr lang="en-US" sz="2800" dirty="0" err="1"/>
+              <a:t>FastQuads</a:t>
+            </a:r>
+            <a:endParaRPr lang="en-US" sz="2800" dirty="0"/>
+          </a:p>
+          <a:p>
+            <a:pPr marL="457200" indent="-457200" algn="l">
+              <a:buFont typeface="Wingdings" panose="05000000000000000000" pitchFamily="2" charset="2"/>
+              <a:buChar char="ü"/>
+            </a:pPr>
+            <a:r>
+              <a:rPr lang="en-US" sz="2800" dirty="0"/>
+              <a:t>Runs</a:t>
+            </a:r>
+          </a:p>
+          <a:p>
+            <a:pPr marL="457200" indent="-457200" algn="l">
+              <a:buFont typeface="Wingdings" panose="05000000000000000000" pitchFamily="2" charset="2"/>
+              <a:buChar char="ü"/>
+            </a:pPr>
+            <a:r>
+              <a:rPr lang="en-US" sz="2800" dirty="0" err="1"/>
+              <a:t>Total_chairs</a:t>
+            </a:r>
+            <a:endParaRPr lang="en-US" sz="2600" dirty="0"/>
+          </a:p>
+        </p:txBody>
+      </p:sp>
+      <p:pic>
+        <p:nvPicPr>
+          <p:cNvPr id="5" name="Picture 4" descr="Calendar&#10;&#10;Description automatically generated">
+            <a:extLst>
+              <a:ext uri="{FF2B5EF4-FFF2-40B4-BE49-F238E27FC236}">
+                <a16:creationId xmlns:a16="http://schemas.microsoft.com/office/drawing/2014/main" id="{B70D1523-D1E2-4D55-82A3-829F4D9E4459}"/>
+              </a:ext>
+            </a:extLst>
+          </p:cNvPr>
+          <p:cNvPicPr>
+            <a:picLocks noChangeAspect="1"/>
+          </p:cNvPicPr>
+          <p:nvPr/>
+        </p:nvPicPr>
+        <p:blipFill>
+          <a:blip r:embed="rId2">
+            <a:extLst>
+              <a:ext uri="{28A0092B-C50C-407E-A947-70E740481C1C}">
+                <a14:useLocalDpi xmlns:a14="http://schemas.microsoft.com/office/drawing/2010/main" val="0"/>
+              </a:ext>
+            </a:extLst>
+          </a:blip>
+          <a:stretch>
+            <a:fillRect/>
+          </a:stretch>
+        </p:blipFill>
+        <p:spPr>
+          <a:xfrm>
+            <a:off x="4990319" y="0"/>
+            <a:ext cx="7201681" cy="6858000"/>
+          </a:xfrm>
+          <a:prstGeom prst="roundRect">
+            <a:avLst>
+              <a:gd name="adj" fmla="val 8594"/>
+            </a:avLst>
+          </a:prstGeom>
+          <a:solidFill>
+            <a:srgbClr val="FFFFFF">
+              <a:shade val="85000"/>
+            </a:srgbClr>
+          </a:solidFill>
+          <a:ln>
+            <a:noFill/>
+          </a:ln>
+          <a:effectLst>
+            <a:reflection blurRad="12700" stA="38000" endPos="28000" dist="5000" dir="5400000" sy="-100000" algn="bl" rotWithShape="0"/>
+          </a:effectLst>
+        </p:spPr>
+      </p:pic>
+      <p:sp>
+        <p:nvSpPr>
+          <p:cNvPr id="22" name="Arrow: Right 21">
+            <a:extLst>
+              <a:ext uri="{FF2B5EF4-FFF2-40B4-BE49-F238E27FC236}">
+                <a16:creationId xmlns:a16="http://schemas.microsoft.com/office/drawing/2014/main" id="{27AF2341-944C-4A9E-964D-3B36F7728C7B}"/>
+              </a:ext>
+            </a:extLst>
+          </p:cNvPr>
+          <p:cNvSpPr/>
+          <p:nvPr/>
+        </p:nvSpPr>
+        <p:spPr>
+          <a:xfrm>
+            <a:off x="5571919" y="135229"/>
+            <a:ext cx="1223586" cy="463407"/>
+          </a:xfrm>
+          <a:prstGeom prst="rightArrow">
+            <a:avLst/>
+          </a:prstGeom>
+        </p:spPr>
+        <p:style>
+          <a:lnRef idx="2">
+            <a:schemeClr val="accent1">
+              <a:shade val="50000"/>
+            </a:schemeClr>
+          </a:lnRef>
+          <a:fillRef idx="1">
+            <a:schemeClr val="accent1"/>
+          </a:fillRef>
+          <a:effectRef idx="0">
+            <a:schemeClr val="accent1"/>
+          </a:effectRef>
+          <a:fontRef idx="minor">
+            <a:schemeClr val="lt1"/>
+          </a:fontRef>
+        </p:style>
+        <p:txBody>
+          <a:bodyPr rtlCol="0" anchor="ctr"/>
+          <a:lstStyle/>
+          <a:p>
+            <a:pPr algn="ctr"/>
+            <a:endParaRPr lang="en-US"/>
+          </a:p>
+        </p:txBody>
+      </p:sp>
+      <p:sp>
+        <p:nvSpPr>
+          <p:cNvPr id="23" name="Arrow: Right 22">
+            <a:extLst>
+              <a:ext uri="{FF2B5EF4-FFF2-40B4-BE49-F238E27FC236}">
+                <a16:creationId xmlns:a16="http://schemas.microsoft.com/office/drawing/2014/main" id="{3B053FF7-51E8-4833-BC9D-719419C9ED3D}"/>
+              </a:ext>
+            </a:extLst>
+          </p:cNvPr>
+          <p:cNvSpPr/>
+          <p:nvPr/>
+        </p:nvSpPr>
+        <p:spPr>
+          <a:xfrm>
+            <a:off x="5563628" y="1055345"/>
+            <a:ext cx="1223586" cy="463407"/>
+          </a:xfrm>
+          <a:prstGeom prst="rightArrow">
+            <a:avLst/>
+          </a:prstGeom>
+        </p:spPr>
+        <p:style>
+          <a:lnRef idx="2">
+            <a:schemeClr val="accent1">
+              <a:shade val="50000"/>
+            </a:schemeClr>
+          </a:lnRef>
+          <a:fillRef idx="1">
+            <a:schemeClr val="accent1"/>
+          </a:fillRef>
+          <a:effectRef idx="0">
+            <a:schemeClr val="accent1"/>
+          </a:effectRef>
+          <a:fontRef idx="minor">
+            <a:schemeClr val="lt1"/>
+          </a:fontRef>
+        </p:style>
+        <p:txBody>
+          <a:bodyPr rtlCol="0" anchor="ctr"/>
+          <a:lstStyle/>
+          <a:p>
+            <a:pPr algn="ctr"/>
+            <a:endParaRPr lang="en-US"/>
+          </a:p>
+        </p:txBody>
+      </p:sp>
+      <p:sp>
+        <p:nvSpPr>
+          <p:cNvPr id="25" name="Arrow: Right 24">
+            <a:extLst>
+              <a:ext uri="{FF2B5EF4-FFF2-40B4-BE49-F238E27FC236}">
+                <a16:creationId xmlns:a16="http://schemas.microsoft.com/office/drawing/2014/main" id="{23748FFC-37A4-4F1A-BE96-DA87D8164C51}"/>
+              </a:ext>
+            </a:extLst>
+          </p:cNvPr>
+          <p:cNvSpPr/>
+          <p:nvPr/>
+        </p:nvSpPr>
+        <p:spPr>
+          <a:xfrm rot="16200000">
+            <a:off x="8976285" y="3293103"/>
+            <a:ext cx="1223586" cy="463407"/>
+          </a:xfrm>
+          <a:prstGeom prst="rightArrow">
+            <a:avLst/>
+          </a:prstGeom>
+        </p:spPr>
+        <p:style>
+          <a:lnRef idx="2">
+            <a:schemeClr val="accent1">
+              <a:shade val="50000"/>
+            </a:schemeClr>
+          </a:lnRef>
+          <a:fillRef idx="1">
+            <a:schemeClr val="accent1"/>
+          </a:fillRef>
+          <a:effectRef idx="0">
+            <a:schemeClr val="accent1"/>
+          </a:effectRef>
+          <a:fontRef idx="minor">
+            <a:schemeClr val="lt1"/>
+          </a:fontRef>
+        </p:style>
+        <p:txBody>
+          <a:bodyPr rtlCol="0" anchor="ctr"/>
+          <a:lstStyle/>
+          <a:p>
+            <a:pPr algn="ctr"/>
+            <a:endParaRPr lang="en-US"/>
+          </a:p>
+        </p:txBody>
+      </p:sp>
+      <p:sp>
+        <p:nvSpPr>
+          <p:cNvPr id="27" name="Arrow: Right 26">
+            <a:extLst>
+              <a:ext uri="{FF2B5EF4-FFF2-40B4-BE49-F238E27FC236}">
+                <a16:creationId xmlns:a16="http://schemas.microsoft.com/office/drawing/2014/main" id="{CBD6AA44-7D1D-429F-9FAF-0D31ADB6CEDE}"/>
+              </a:ext>
+            </a:extLst>
+          </p:cNvPr>
+          <p:cNvSpPr/>
+          <p:nvPr/>
+        </p:nvSpPr>
+        <p:spPr>
+          <a:xfrm rot="16200000">
+            <a:off x="10753555" y="3293103"/>
+            <a:ext cx="1223586" cy="463407"/>
+          </a:xfrm>
+          <a:prstGeom prst="rightArrow">
+            <a:avLst/>
+          </a:prstGeom>
+        </p:spPr>
+        <p:style>
+          <a:lnRef idx="2">
+            <a:schemeClr val="accent1">
+              <a:shade val="50000"/>
+            </a:schemeClr>
+          </a:lnRef>
+          <a:fillRef idx="1">
+            <a:schemeClr val="accent1"/>
+          </a:fillRef>
+          <a:effectRef idx="0">
+            <a:schemeClr val="accent1"/>
+          </a:effectRef>
+          <a:fontRef idx="minor">
+            <a:schemeClr val="lt1"/>
+          </a:fontRef>
+        </p:style>
+        <p:txBody>
+          <a:bodyPr rtlCol="0" anchor="ctr"/>
+          <a:lstStyle/>
+          <a:p>
+            <a:pPr algn="ctr"/>
+            <a:endParaRPr lang="en-US"/>
+          </a:p>
+        </p:txBody>
+      </p:sp>
+    </p:spTree>
+    <p:extLst>
+      <p:ext uri="{BB962C8B-B14F-4D97-AF65-F5344CB8AC3E}">
+        <p14:creationId xmlns:p14="http://schemas.microsoft.com/office/powerpoint/2010/main" val="2597606514"/>
+      </p:ext>
+    </p:extLst>
+  </p:cSld>
+  <p:clrMapOvr>
+    <a:masterClrMapping/>
+  </p:clrMapOvr>
+</p:sld>
+</file>
+
+<file path=ppt/slides/slide7.xml><?xml version="1.0" encoding="utf-8"?>
+<p:sld xmlns:a="http://schemas.openxmlformats.org/drawingml/2006/main" xmlns:r="http://schemas.openxmlformats.org/officeDocument/2006/relationships" xmlns:p="http://schemas.openxmlformats.org/presentationml/2006/main">
+  <p:cSld>
+    <p:spTree>
+      <p:nvGrpSpPr>
+        <p:cNvPr id="1" name=""/>
+        <p:cNvGrpSpPr/>
+        <p:nvPr/>
+      </p:nvGrpSpPr>
+      <p:grpSpPr>
+        <a:xfrm>
+          <a:off x="0" y="0"/>
+          <a:ext cx="0" cy="0"/>
+          <a:chOff x="0" y="0"/>
+          <a:chExt cx="0" cy="0"/>
+        </a:xfrm>
+      </p:grpSpPr>
+      <p:sp>
+        <p:nvSpPr>
+          <p:cNvPr id="2" name="Title 1">
+            <a:extLst>
+              <a:ext uri="{FF2B5EF4-FFF2-40B4-BE49-F238E27FC236}">
+                <a16:creationId xmlns:a16="http://schemas.microsoft.com/office/drawing/2014/main" id="{993FE3BF-F38A-42A7-A020-3D84738627C9}"/>
+              </a:ext>
+            </a:extLst>
+          </p:cNvPr>
+          <p:cNvSpPr>
+            <a:spLocks noGrp="1"/>
+          </p:cNvSpPr>
+          <p:nvPr>
+            <p:ph type="ctrTitle"/>
+          </p:nvPr>
+        </p:nvSpPr>
+        <p:spPr>
+          <a:xfrm>
+            <a:off x="326264" y="45000"/>
+            <a:ext cx="10968507" cy="1455390"/>
+          </a:xfrm>
+        </p:spPr>
+        <p:txBody>
+          <a:bodyPr/>
+          <a:lstStyle/>
+          <a:p>
+            <a:pPr algn="l"/>
+            <a:r>
+              <a:rPr lang="en-US" dirty="0"/>
+              <a:t>Recommendation and key findings:</a:t>
             </a:r>
           </a:p>
         </p:txBody>
@@ -6285,9 +7521,22 @@
             <a:off x="720752" y="2788200"/>
             <a:ext cx="4754475" cy="3774965"/>
           </a:xfrm>
-          <a:prstGeom prst="rect">
-            <a:avLst/>
+          <a:prstGeom prst="roundRect">
+            <a:avLst>
+              <a:gd name="adj" fmla="val 8594"/>
+            </a:avLst>
           </a:prstGeom>
+          <a:solidFill>
+            <a:srgbClr val="FFFFFF">
+              <a:shade val="85000"/>
+            </a:srgbClr>
+          </a:solidFill>
+          <a:ln>
+            <a:noFill/>
+          </a:ln>
+          <a:effectLst>
+            <a:reflection blurRad="12700" stA="38000" endPos="28000" dist="5000" dir="5400000" sy="-100000" algn="bl" rotWithShape="0"/>
+          </a:effectLst>
         </p:spPr>
       </p:pic>
       <p:sp>
@@ -6727,9 +7976,22 @@
             <a:off x="6322287" y="2788200"/>
             <a:ext cx="4493730" cy="3768000"/>
           </a:xfrm>
-          <a:prstGeom prst="rect">
-            <a:avLst/>
+          <a:prstGeom prst="roundRect">
+            <a:avLst>
+              <a:gd name="adj" fmla="val 8594"/>
+            </a:avLst>
           </a:prstGeom>
+          <a:solidFill>
+            <a:srgbClr val="FFFFFF">
+              <a:shade val="85000"/>
+            </a:srgbClr>
+          </a:solidFill>
+          <a:ln>
+            <a:noFill/>
+          </a:ln>
+          <a:effectLst>
+            <a:reflection blurRad="12700" stA="38000" endPos="28000" dist="5000" dir="5400000" sy="-100000" algn="bl" rotWithShape="0"/>
+          </a:effectLst>
         </p:spPr>
       </p:pic>
     </p:spTree>
@@ -6745,7 +8007,7 @@
 </p:sld>
 </file>
 
-<file path=ppt/slides/slide3.xml><?xml version="1.0" encoding="utf-8"?>
+<file path=ppt/slides/slide8.xml><?xml version="1.0" encoding="utf-8"?>
 <p:sld xmlns:a="http://schemas.openxmlformats.org/drawingml/2006/main" xmlns:r="http://schemas.openxmlformats.org/officeDocument/2006/relationships" xmlns:p="http://schemas.openxmlformats.org/presentationml/2006/main">
   <p:cSld>
     <p:spTree>
@@ -6780,17 +8042,18 @@
         </p:nvSpPr>
         <p:spPr>
           <a:xfrm>
-            <a:off x="1370693" y="110074"/>
-            <a:ext cx="9440034" cy="1049867"/>
+            <a:off x="169334" y="110074"/>
+            <a:ext cx="10641393" cy="1049867"/>
           </a:xfrm>
         </p:spPr>
         <p:txBody>
           <a:bodyPr/>
           <a:lstStyle/>
           <a:p>
+            <a:pPr algn="l"/>
             <a:r>
               <a:rPr lang="en-US" dirty="0"/>
-              <a:t>Modeling results and analysis</a:t>
+              <a:t>Modeling results and analysis:</a:t>
             </a:r>
           </a:p>
         </p:txBody>
@@ -6873,9 +8136,22 @@
             <a:off x="5731933" y="1724628"/>
             <a:ext cx="6290733" cy="5035540"/>
           </a:xfrm>
-          <a:prstGeom prst="rect">
-            <a:avLst/>
+          <a:prstGeom prst="roundRect">
+            <a:avLst>
+              <a:gd name="adj" fmla="val 8594"/>
+            </a:avLst>
           </a:prstGeom>
+          <a:solidFill>
+            <a:srgbClr val="FFFFFF">
+              <a:shade val="85000"/>
+            </a:srgbClr>
+          </a:solidFill>
+          <a:ln>
+            <a:noFill/>
+          </a:ln>
+          <a:effectLst>
+            <a:reflection blurRad="12700" stA="38000" endPos="28000" dist="5000" dir="5400000" sy="-100000" algn="bl" rotWithShape="0"/>
+          </a:effectLst>
         </p:spPr>
       </p:pic>
       <p:pic>
@@ -6909,9 +8185,22 @@
             <a:off x="1092223" y="3188157"/>
             <a:ext cx="3530553" cy="3559768"/>
           </a:xfrm>
-          <a:prstGeom prst="rect">
-            <a:avLst/>
+          <a:prstGeom prst="roundRect">
+            <a:avLst>
+              <a:gd name="adj" fmla="val 8594"/>
+            </a:avLst>
           </a:prstGeom>
+          <a:solidFill>
+            <a:srgbClr val="FFFFFF">
+              <a:shade val="85000"/>
+            </a:srgbClr>
+          </a:solidFill>
+          <a:ln>
+            <a:noFill/>
+          </a:ln>
+          <a:effectLst>
+            <a:reflection blurRad="12700" stA="38000" endPos="28000" dist="5000" dir="5400000" sy="-100000" algn="bl" rotWithShape="0"/>
+          </a:effectLst>
         </p:spPr>
       </p:pic>
     </p:spTree>
@@ -6927,7 +8216,7 @@
 </p:sld>
 </file>
 
-<file path=ppt/slides/slide4.xml><?xml version="1.0" encoding="utf-8"?>
+<file path=ppt/slides/slide9.xml><?xml version="1.0" encoding="utf-8"?>
 <p:sld xmlns:a="http://schemas.openxmlformats.org/drawingml/2006/main" xmlns:r="http://schemas.openxmlformats.org/officeDocument/2006/relationships" xmlns:p="http://schemas.openxmlformats.org/presentationml/2006/main">
   <p:cSld>
     <p:spTree>
@@ -6970,9 +8259,10 @@
           <a:bodyPr/>
           <a:lstStyle/>
           <a:p>
+            <a:pPr algn="l"/>
             <a:r>
               <a:rPr lang="en-US" dirty="0"/>
-              <a:t>Modeling results and analysis</a:t>
+              <a:t>Modeling results and analysis:</a:t>
             </a:r>
           </a:p>
         </p:txBody>
@@ -7055,169 +8345,28 @@
             <a:off x="1561043" y="2895600"/>
             <a:ext cx="9059333" cy="3685934"/>
           </a:xfrm>
-          <a:prstGeom prst="rect">
-            <a:avLst/>
+          <a:prstGeom prst="roundRect">
+            <a:avLst>
+              <a:gd name="adj" fmla="val 8594"/>
+            </a:avLst>
           </a:prstGeom>
+          <a:solidFill>
+            <a:srgbClr val="FFFFFF">
+              <a:shade val="85000"/>
+            </a:srgbClr>
+          </a:solidFill>
+          <a:ln>
+            <a:noFill/>
+          </a:ln>
+          <a:effectLst>
+            <a:reflection blurRad="12700" stA="38000" endPos="28000" dist="5000" dir="5400000" sy="-100000" algn="bl" rotWithShape="0"/>
+          </a:effectLst>
         </p:spPr>
       </p:pic>
     </p:spTree>
     <p:extLst>
       <p:ext uri="{BB962C8B-B14F-4D97-AF65-F5344CB8AC3E}">
         <p14:creationId xmlns:p14="http://schemas.microsoft.com/office/powerpoint/2010/main" val="3843558669"/>
-      </p:ext>
-    </p:extLst>
-  </p:cSld>
-  <p:clrMapOvr>
-    <a:masterClrMapping/>
-  </p:clrMapOvr>
-</p:sld>
-</file>
-
-<file path=ppt/slides/slide5.xml><?xml version="1.0" encoding="utf-8"?>
-<p:sld xmlns:a="http://schemas.openxmlformats.org/drawingml/2006/main" xmlns:r="http://schemas.openxmlformats.org/officeDocument/2006/relationships" xmlns:p="http://schemas.openxmlformats.org/presentationml/2006/main">
-  <p:cSld>
-    <p:spTree>
-      <p:nvGrpSpPr>
-        <p:cNvPr id="1" name=""/>
-        <p:cNvGrpSpPr/>
-        <p:nvPr/>
-      </p:nvGrpSpPr>
-      <p:grpSpPr>
-        <a:xfrm>
-          <a:off x="0" y="0"/>
-          <a:ext cx="0" cy="0"/>
-          <a:chOff x="0" y="0"/>
-          <a:chExt cx="0" cy="0"/>
-        </a:xfrm>
-      </p:grpSpPr>
-      <p:sp>
-        <p:nvSpPr>
-          <p:cNvPr id="2" name="Title 1">
-            <a:extLst>
-              <a:ext uri="{FF2B5EF4-FFF2-40B4-BE49-F238E27FC236}">
-                <a16:creationId xmlns:a16="http://schemas.microsoft.com/office/drawing/2014/main" id="{993FE3BF-F38A-42A7-A020-3D84738627C9}"/>
-              </a:ext>
-            </a:extLst>
-          </p:cNvPr>
-          <p:cNvSpPr>
-            <a:spLocks noGrp="1"/>
-          </p:cNvSpPr>
-          <p:nvPr>
-            <p:ph type="ctrTitle"/>
-          </p:nvPr>
-        </p:nvSpPr>
-        <p:spPr>
-          <a:xfrm>
-            <a:off x="1370693" y="287875"/>
-            <a:ext cx="9440034" cy="1450774"/>
-          </a:xfrm>
-        </p:spPr>
-        <p:txBody>
-          <a:bodyPr/>
-          <a:lstStyle/>
-          <a:p>
-            <a:r>
-              <a:rPr lang="en-US" dirty="0"/>
-              <a:t>Conclusion</a:t>
-            </a:r>
-          </a:p>
-        </p:txBody>
-      </p:sp>
-      <p:sp>
-        <p:nvSpPr>
-          <p:cNvPr id="3" name="Subtitle 2">
-            <a:extLst>
-              <a:ext uri="{FF2B5EF4-FFF2-40B4-BE49-F238E27FC236}">
-                <a16:creationId xmlns:a16="http://schemas.microsoft.com/office/drawing/2014/main" id="{DDCCDF9F-4F02-4A71-BFA9-D2C006C465AF}"/>
-              </a:ext>
-            </a:extLst>
-          </p:cNvPr>
-          <p:cNvSpPr>
-            <a:spLocks noGrp="1"/>
-          </p:cNvSpPr>
-          <p:nvPr>
-            <p:ph type="subTitle" idx="1"/>
-          </p:nvPr>
-        </p:nvSpPr>
-        <p:spPr>
-          <a:xfrm>
-            <a:off x="1370693" y="2781837"/>
-            <a:ext cx="9440034" cy="3419340"/>
-          </a:xfrm>
-        </p:spPr>
-        <p:txBody>
-          <a:bodyPr/>
-          <a:lstStyle/>
-          <a:p>
-            <a:pPr marL="342900" indent="-342900" algn="l">
-              <a:buFont typeface="Wingdings" panose="05000000000000000000" pitchFamily="2" charset="2"/>
-              <a:buChar char="ü"/>
-            </a:pPr>
-            <a:r>
-              <a:rPr lang="en-US" dirty="0"/>
-              <a:t>Model works based on the idea that most resorts set their prices according to market support</a:t>
-            </a:r>
-          </a:p>
-          <a:p>
-            <a:pPr marL="342900" indent="-342900" algn="l">
-              <a:buFont typeface="Wingdings" panose="05000000000000000000" pitchFamily="2" charset="2"/>
-              <a:buChar char="ü"/>
-            </a:pPr>
-            <a:r>
-              <a:rPr lang="en-US" dirty="0"/>
-              <a:t>Currently, company undercharging for the admission by $5-$10 (within mean absolute error)</a:t>
-            </a:r>
-          </a:p>
-          <a:p>
-            <a:pPr marL="342900" indent="-342900" algn="l">
-              <a:buFont typeface="Wingdings" panose="05000000000000000000" pitchFamily="2" charset="2"/>
-              <a:buChar char="ü"/>
-            </a:pPr>
-            <a:r>
-              <a:rPr lang="en-US" dirty="0"/>
-              <a:t>Adding new chair lift in the future will not increase the annual revenue (most likely it will decrease it significantly)</a:t>
-            </a:r>
-          </a:p>
-          <a:p>
-            <a:pPr marL="342900" indent="-342900" algn="l">
-              <a:buFont typeface="Wingdings" panose="05000000000000000000" pitchFamily="2" charset="2"/>
-              <a:buChar char="ü"/>
-            </a:pPr>
-            <a:r>
-              <a:rPr lang="en-US" dirty="0"/>
-              <a:t>Investing in vertical drop will bring increase by $2 on average</a:t>
-            </a:r>
-          </a:p>
-          <a:p>
-            <a:pPr marL="342900" indent="-342900" algn="l">
-              <a:buFont typeface="Wingdings" panose="05000000000000000000" pitchFamily="2" charset="2"/>
-              <a:buChar char="ü"/>
-            </a:pPr>
-            <a:r>
-              <a:rPr lang="en-US" dirty="0"/>
-              <a:t>Dropping operational cost on a few runs (3 of them) will save some money</a:t>
-            </a:r>
-          </a:p>
-          <a:p>
-            <a:pPr marL="342900" indent="-342900" algn="l">
-              <a:buFont typeface="Wingdings" panose="05000000000000000000" pitchFamily="2" charset="2"/>
-              <a:buChar char="ü"/>
-            </a:pPr>
-            <a:endParaRPr lang="en-US" dirty="0"/>
-          </a:p>
-          <a:p>
-            <a:pPr marL="342900" indent="-342900" algn="l">
-              <a:buFont typeface="Wingdings" panose="05000000000000000000" pitchFamily="2" charset="2"/>
-              <a:buChar char="ü"/>
-            </a:pPr>
-            <a:endParaRPr lang="en-US" dirty="0"/>
-          </a:p>
-        </p:txBody>
-      </p:sp>
-    </p:spTree>
-    <p:extLst>
-      <p:ext uri="{BB962C8B-B14F-4D97-AF65-F5344CB8AC3E}">
-        <p14:creationId xmlns:p14="http://schemas.microsoft.com/office/powerpoint/2010/main" val="713166741"/>
       </p:ext>
     </p:extLst>
   </p:cSld>

</xml_diff>